<commit_message>
Found the error. 0N state and GKP state should work now.
</commit_message>
<xml_diff>
--- a/Non-Gaussian States.pptx
+++ b/Non-Gaussian States.pptx
@@ -16883,49 +16883,10 @@
 </file>
 
 <file path=customXml/item1.xml><?xml version="1.0" encoding="utf-8"?>
-<TemplafySlideFormConfiguration><![CDATA[{"formFields":[],"formDataEntries":[]}]]></TemplafySlideFormConfiguration>
+<TemplafySlideTemplateConfiguration><![CDATA[{"elementsMetadata":[],"documentContentValidatorConfiguration":{"enableDocumentContentValidator":false,"documentContentValidatorVersion":0},"slideId":"636957682264057965","enableDocumentContentUpdater":true,"version":"1.2"}]]></TemplafySlideTemplateConfiguration>
 </file>
 
 <file path=customXml/item10.xml><?xml version="1.0" encoding="utf-8"?>
-<TemplafySlideFormConfiguration><![CDATA[{"formFields":[],"formDataEntries":[]}]]></TemplafySlideFormConfiguration>
-</file>
-
-<file path=customXml/item11.xml><?xml version="1.0" encoding="utf-8"?>
-<TemplafySlideTemplateConfiguration><![CDATA[{"elementsMetadata":[],"documentContentValidatorConfiguration":{"enableDocumentContentValidator":false,"documentContentValidatorVersion":0},"slideId":"636957682264370159","enableDocumentContentUpdater":true,"version":"1.2"}]]></TemplafySlideTemplateConfiguration>
-</file>
-
-<file path=customXml/item2.xml><?xml version="1.0" encoding="utf-8"?>
-<TemplafySlideTemplateConfiguration><![CDATA[{"elementsMetadata":[],"documentContentValidatorConfiguration":{"enableDocumentContentValidator":false,"documentContentValidatorVersion":0},"slideId":"636957682264213454","enableDocumentContentUpdater":true,"version":"1.2"}]]></TemplafySlideTemplateConfiguration>
-</file>
-
-<file path=customXml/item3.xml><?xml version="1.0" encoding="utf-8"?>
-<?mso-contentType ?>
-<FormTemplates xmlns="http://schemas.microsoft.com/sharepoint/v3/contenttype/forms">
-  <Display>DocumentLibraryForm</Display>
-  <Edit>DocumentLibraryForm</Edit>
-  <New>DocumentLibraryForm</New>
-</FormTemplates>
-</file>
-
-<file path=customXml/item4.xml><?xml version="1.0" encoding="utf-8"?>
-<TemplafyFormConfiguration><![CDATA[{"formFields":[{"required":false,"type":"datePicker","name":"Date","label":"Date","helpTexts":{"prefix":"","postfix":""},"spacing":{},"fullyQualifiedName":"Date"},{"required":false,"placeholder":"","lines":0,"type":"textBox","name":"PresentationTitle","label":"Presentation title","helpTexts":{"prefix":"","postfix":""},"spacing":{},"fullyQualifiedName":"PresentationTitle"}],"formDataEntries":[]}]]></TemplafyFormConfiguration>
-</file>
-
-<file path=customXml/item5.xml><?xml version="1.0" encoding="utf-8"?>
-<TemplafySlideFormConfiguration><![CDATA[{"formFields":[],"formDataEntries":[]}]]></TemplafySlideFormConfiguration>
-</file>
-
-<file path=customXml/item6.xml><?xml version="1.0" encoding="utf-8"?>
-<p:properties xmlns:p="http://schemas.microsoft.com/office/2006/metadata/properties" xmlns:xsi="http://www.w3.org/2001/XMLSchema-instance" xmlns:pc="http://schemas.microsoft.com/office/infopath/2007/PartnerControls">
-  <documentManagement/>
-</p:properties>
-</file>
-
-<file path=customXml/item7.xml><?xml version="1.0" encoding="utf-8"?>
-<TemplafySlideTemplateConfiguration><![CDATA[{"elementsMetadata":[],"documentContentValidatorConfiguration":{"enableDocumentContentValidator":false,"documentContentValidatorVersion":0},"slideId":"636957682264057965","enableDocumentContentUpdater":true,"version":"1.2"}]]></TemplafySlideTemplateConfiguration>
-</file>
-
-<file path=customXml/item8.xml><?xml version="1.0" encoding="utf-8"?>
 <ct:contentTypeSchema xmlns:ct="http://schemas.microsoft.com/office/2006/metadata/contentType" xmlns:ma="http://schemas.microsoft.com/office/2006/metadata/properties/metaAttributes" ct:_="" ma:_="" ma:contentTypeName="Document" ma:contentTypeID="0x0101009ADA1FD2B40FDA458284BB6FCA763489" ma:contentTypeVersion="5" ma:contentTypeDescription="Create a new document." ma:contentTypeScope="" ma:versionID="72b2569ebc96083092f6d8e76413cd52">
   <xsd:schema xmlns:xsd="http://www.w3.org/2001/XMLSchema" xmlns:xs="http://www.w3.org/2001/XMLSchema" xmlns:p="http://schemas.microsoft.com/office/2006/metadata/properties" xmlns:ns2="683dcda1-f8c3-442f-ae64-e236c052732d" xmlns:ns3="715bde23-c48d-41ea-a697-dffaa8fbae8d" targetNamespace="http://schemas.microsoft.com/office/2006/metadata/properties" ma:root="true" ma:fieldsID="df14c340b530a7b5c38005fefa6a5693" ns2:_="" ns3:_="">
     <xsd:import namespace="683dcda1-f8c3-442f-ae64-e236c052732d"/>
@@ -17096,70 +17057,56 @@
 </ct:contentTypeSchema>
 </file>
 
+<file path=customXml/item11.xml><?xml version="1.0" encoding="utf-8"?>
+<?mso-contentType ?>
+<FormTemplates xmlns="http://schemas.microsoft.com/sharepoint/v3/contenttype/forms">
+  <Display>DocumentLibraryForm</Display>
+  <Edit>DocumentLibraryForm</Edit>
+  <New>DocumentLibraryForm</New>
+</FormTemplates>
+</file>
+
+<file path=customXml/item2.xml><?xml version="1.0" encoding="utf-8"?>
+<TemplafySlideTemplateConfiguration><![CDATA[{"elementsMetadata":[],"documentContentValidatorConfiguration":{"enableDocumentContentValidator":false,"documentContentValidatorVersion":0},"slideId":"636957682264213454","enableDocumentContentUpdater":true,"version":"1.2"}]]></TemplafySlideTemplateConfiguration>
+</file>
+
+<file path=customXml/item3.xml><?xml version="1.0" encoding="utf-8"?>
+<TemplafySlideFormConfiguration><![CDATA[{"formFields":[],"formDataEntries":[]}]]></TemplafySlideFormConfiguration>
+</file>
+
+<file path=customXml/item4.xml><?xml version="1.0" encoding="utf-8"?>
+<p:properties xmlns:p="http://schemas.microsoft.com/office/2006/metadata/properties" xmlns:xsi="http://www.w3.org/2001/XMLSchema-instance" xmlns:pc="http://schemas.microsoft.com/office/infopath/2007/PartnerControls">
+  <documentManagement/>
+</p:properties>
+</file>
+
+<file path=customXml/item5.xml><?xml version="1.0" encoding="utf-8"?>
+<TemplafySlideTemplateConfiguration><![CDATA[{"elementsMetadata":[],"documentContentValidatorConfiguration":{"enableDocumentContentValidator":false,"documentContentValidatorVersion":0},"slideId":"636957682264370159","enableDocumentContentUpdater":true,"version":"1.2"}]]></TemplafySlideTemplateConfiguration>
+</file>
+
+<file path=customXml/item6.xml><?xml version="1.0" encoding="utf-8"?>
+<TemplafySlideFormConfiguration><![CDATA[{"formFields":[],"formDataEntries":[]}]]></TemplafySlideFormConfiguration>
+</file>
+
+<file path=customXml/item7.xml><?xml version="1.0" encoding="utf-8"?>
+<TemplafySlideFormConfiguration><![CDATA[{"formFields":[],"formDataEntries":[]}]]></TemplafySlideFormConfiguration>
+</file>
+
+<file path=customXml/item8.xml><?xml version="1.0" encoding="utf-8"?>
+<TemplafyFormConfiguration><![CDATA[{"formFields":[{"required":false,"type":"datePicker","name":"Date","label":"Date","helpTexts":{"prefix":"","postfix":""},"spacing":{},"fullyQualifiedName":"Date"},{"required":false,"placeholder":"","lines":0,"type":"textBox","name":"PresentationTitle","label":"Presentation title","helpTexts":{"prefix":"","postfix":""},"spacing":{},"fullyQualifiedName":"PresentationTitle"}],"formDataEntries":[]}]]></TemplafyFormConfiguration>
+</file>
+
 <file path=customXml/item9.xml><?xml version="1.0" encoding="utf-8"?>
 <TemplafyTemplateConfiguration><![CDATA[{"elementsMetadata":[],"transformationConfigurations":[{"language":"{{DocumentLanguage}}","disableUpdates":false,"type":"proofingLanguage"}],"templateName":"DTU Template 16_9 - Purple","templateDescription":"","enableDocumentContentUpdater":true,"version":"1.2"}]]></TemplafyTemplateConfiguration>
 </file>
 
 <file path=customXml/itemProps1.xml><?xml version="1.0" encoding="utf-8"?>
-<ds:datastoreItem xmlns:ds="http://schemas.openxmlformats.org/officeDocument/2006/customXml" ds:itemID="{E618FA3B-8A67-40AE-8AE5-229504AB69D3}">
+<ds:datastoreItem xmlns:ds="http://schemas.openxmlformats.org/officeDocument/2006/customXml" ds:itemID="{ECA1DA60-FB17-4EB5-97F4-62F99A1A733D}">
   <ds:schemaRefs/>
 </ds:datastoreItem>
 </file>
 
 <file path=customXml/itemProps10.xml><?xml version="1.0" encoding="utf-8"?>
-<ds:datastoreItem xmlns:ds="http://schemas.openxmlformats.org/officeDocument/2006/customXml" ds:itemID="{1E43399D-8007-4F72-91D7-7F8945197D6C}">
-  <ds:schemaRefs/>
-</ds:datastoreItem>
-</file>
-
-<file path=customXml/itemProps11.xml><?xml version="1.0" encoding="utf-8"?>
-<ds:datastoreItem xmlns:ds="http://schemas.openxmlformats.org/officeDocument/2006/customXml" ds:itemID="{7E7EDC85-DB9F-43CD-A2D6-F1E982D0511E}">
-  <ds:schemaRefs/>
-</ds:datastoreItem>
-</file>
-
-<file path=customXml/itemProps2.xml><?xml version="1.0" encoding="utf-8"?>
-<ds:datastoreItem xmlns:ds="http://schemas.openxmlformats.org/officeDocument/2006/customXml" ds:itemID="{B30A78E7-315B-4170-8116-72928D1FEAD9}">
-  <ds:schemaRefs/>
-</ds:datastoreItem>
-</file>
-
-<file path=customXml/itemProps3.xml><?xml version="1.0" encoding="utf-8"?>
-<ds:datastoreItem xmlns:ds="http://schemas.openxmlformats.org/officeDocument/2006/customXml" ds:itemID="{3FAD9687-A325-465A-822F-98C7D264CFD7}">
-  <ds:schemaRefs>
-    <ds:schemaRef ds:uri="http://schemas.microsoft.com/sharepoint/v3/contenttype/forms"/>
-  </ds:schemaRefs>
-</ds:datastoreItem>
-</file>
-
-<file path=customXml/itemProps4.xml><?xml version="1.0" encoding="utf-8"?>
-<ds:datastoreItem xmlns:ds="http://schemas.openxmlformats.org/officeDocument/2006/customXml" ds:itemID="{69ED2CA6-29BB-4407-9012-18ED2ECCD16E}">
-  <ds:schemaRefs/>
-</ds:datastoreItem>
-</file>
-
-<file path=customXml/itemProps5.xml><?xml version="1.0" encoding="utf-8"?>
-<ds:datastoreItem xmlns:ds="http://schemas.openxmlformats.org/officeDocument/2006/customXml" ds:itemID="{A24B75EB-8202-4907-9D1E-5F9CF0C29483}">
-  <ds:schemaRefs/>
-</ds:datastoreItem>
-</file>
-
-<file path=customXml/itemProps6.xml><?xml version="1.0" encoding="utf-8"?>
-<ds:datastoreItem xmlns:ds="http://schemas.openxmlformats.org/officeDocument/2006/customXml" ds:itemID="{C7696DC1-7A22-4198-A4D1-783EAEBC6DD4}">
-  <ds:schemaRefs>
-    <ds:schemaRef ds:uri="http://schemas.microsoft.com/office/2006/metadata/properties"/>
-    <ds:schemaRef ds:uri="http://schemas.microsoft.com/office/infopath/2007/PartnerControls"/>
-  </ds:schemaRefs>
-</ds:datastoreItem>
-</file>
-
-<file path=customXml/itemProps7.xml><?xml version="1.0" encoding="utf-8"?>
-<ds:datastoreItem xmlns:ds="http://schemas.openxmlformats.org/officeDocument/2006/customXml" ds:itemID="{ECA1DA60-FB17-4EB5-97F4-62F99A1A733D}">
-  <ds:schemaRefs/>
-</ds:datastoreItem>
-</file>
-
-<file path=customXml/itemProps8.xml><?xml version="1.0" encoding="utf-8"?>
 <ds:datastoreItem xmlns:ds="http://schemas.openxmlformats.org/officeDocument/2006/customXml" ds:itemID="{9F0C0281-0754-4C07-B1CB-D9771AB751DC}">
   <ds:schemaRefs>
     <ds:schemaRef ds:uri="http://schemas.microsoft.com/office/2006/metadata/contentType"/>
@@ -17178,6 +17125,59 @@
 </ds:datastoreItem>
 </file>
 
+<file path=customXml/itemProps11.xml><?xml version="1.0" encoding="utf-8"?>
+<ds:datastoreItem xmlns:ds="http://schemas.openxmlformats.org/officeDocument/2006/customXml" ds:itemID="{3FAD9687-A325-465A-822F-98C7D264CFD7}">
+  <ds:schemaRefs>
+    <ds:schemaRef ds:uri="http://schemas.microsoft.com/sharepoint/v3/contenttype/forms"/>
+  </ds:schemaRefs>
+</ds:datastoreItem>
+</file>
+
+<file path=customXml/itemProps2.xml><?xml version="1.0" encoding="utf-8"?>
+<ds:datastoreItem xmlns:ds="http://schemas.openxmlformats.org/officeDocument/2006/customXml" ds:itemID="{B30A78E7-315B-4170-8116-72928D1FEAD9}">
+  <ds:schemaRefs/>
+</ds:datastoreItem>
+</file>
+
+<file path=customXml/itemProps3.xml><?xml version="1.0" encoding="utf-8"?>
+<ds:datastoreItem xmlns:ds="http://schemas.openxmlformats.org/officeDocument/2006/customXml" ds:itemID="{E618FA3B-8A67-40AE-8AE5-229504AB69D3}">
+  <ds:schemaRefs/>
+</ds:datastoreItem>
+</file>
+
+<file path=customXml/itemProps4.xml><?xml version="1.0" encoding="utf-8"?>
+<ds:datastoreItem xmlns:ds="http://schemas.openxmlformats.org/officeDocument/2006/customXml" ds:itemID="{C7696DC1-7A22-4198-A4D1-783EAEBC6DD4}">
+  <ds:schemaRefs>
+    <ds:schemaRef ds:uri="http://schemas.microsoft.com/office/2006/metadata/properties"/>
+    <ds:schemaRef ds:uri="http://schemas.microsoft.com/office/infopath/2007/PartnerControls"/>
+  </ds:schemaRefs>
+</ds:datastoreItem>
+</file>
+
+<file path=customXml/itemProps5.xml><?xml version="1.0" encoding="utf-8"?>
+<ds:datastoreItem xmlns:ds="http://schemas.openxmlformats.org/officeDocument/2006/customXml" ds:itemID="{7E7EDC85-DB9F-43CD-A2D6-F1E982D0511E}">
+  <ds:schemaRefs/>
+</ds:datastoreItem>
+</file>
+
+<file path=customXml/itemProps6.xml><?xml version="1.0" encoding="utf-8"?>
+<ds:datastoreItem xmlns:ds="http://schemas.openxmlformats.org/officeDocument/2006/customXml" ds:itemID="{A24B75EB-8202-4907-9D1E-5F9CF0C29483}">
+  <ds:schemaRefs/>
+</ds:datastoreItem>
+</file>
+
+<file path=customXml/itemProps7.xml><?xml version="1.0" encoding="utf-8"?>
+<ds:datastoreItem xmlns:ds="http://schemas.openxmlformats.org/officeDocument/2006/customXml" ds:itemID="{1E43399D-8007-4F72-91D7-7F8945197D6C}">
+  <ds:schemaRefs/>
+</ds:datastoreItem>
+</file>
+
+<file path=customXml/itemProps8.xml><?xml version="1.0" encoding="utf-8"?>
+<ds:datastoreItem xmlns:ds="http://schemas.openxmlformats.org/officeDocument/2006/customXml" ds:itemID="{69ED2CA6-29BB-4407-9012-18ED2ECCD16E}">
+  <ds:schemaRefs/>
+</ds:datastoreItem>
+</file>
+
 <file path=customXml/itemProps9.xml><?xml version="1.0" encoding="utf-8"?>
 <ds:datastoreItem xmlns:ds="http://schemas.openxmlformats.org/officeDocument/2006/customXml" ds:itemID="{1334258C-C3E7-4029-A615-C886A240FB15}">
   <ds:schemaRefs/>

</xml_diff>